<commit_message>
feat: Add validation scripts for PPTX and PDF outputs
- Implemented `validate_font_sizes.py` to check font size consistency between source and merged PPTX files.
- Developed `validate_output.py` to validate merged PPTX and PDF outputs for corruption and consistency.
- Created `setup_env.sh` for setting up a Python virtual environment and installing dependencies.
- Removed outdated `README.md`, `merge_pptx.py`, `merge_template.py`, and other legacy scripts.
- Added comprehensive test suite `test-merge-validation.sh` for merge operations with validation checks.
- Introduced `test.sh` for validating Docker setup and ensuring all tools and scripts work correctly inside Docker.
</commit_message>
<xml_diff>
--- a/assets/slides/templates/test1.pptx
+++ b/assets/slides/templates/test1.pptx
@@ -197,7 +197,7 @@
           <a:p>
             <a:fld id="{D25CCE5E-5E87-084D-B791-8F82D6CE5D6A}" type="datetimeFigureOut">
               <a:rPr lang="en-US" smtClean="0"/>
-              <a:t>12/22/25</a:t>
+              <a:t>1/10/26</a:t>
             </a:fld>
             <a:endParaRPr lang="en-US"/>
           </a:p>
@@ -723,7 +723,7 @@
           <a:p>
             <a:fld id="{567B50E4-2343-4B20-80BE-1605C97DFB16}" type="datetime1">
               <a:rPr lang="en-US" smtClean="0"/>
-              <a:t>12/22/25</a:t>
+              <a:t>1/10/26</a:t>
             </a:fld>
             <a:endParaRPr lang="en-US"/>
           </a:p>
@@ -1020,7 +1020,7 @@
           <a:p>
             <a:fld id="{CE6CA204-B091-40ED-8158-331EE628B522}" type="datetime1">
               <a:rPr lang="en-US" smtClean="0"/>
-              <a:t>12/22/25</a:t>
+              <a:t>1/10/26</a:t>
             </a:fld>
             <a:endParaRPr lang="en-US" dirty="0"/>
           </a:p>
@@ -1258,7 +1258,7 @@
           <a:p>
             <a:fld id="{23692F09-9D88-4105-92F6-7298804EAA90}" type="datetime1">
               <a:rPr lang="en-US" smtClean="0"/>
-              <a:t>12/22/25</a:t>
+              <a:t>1/10/26</a:t>
             </a:fld>
             <a:endParaRPr lang="en-US"/>
           </a:p>
@@ -1475,7 +1475,7 @@
           <a:p>
             <a:fld id="{33744F96-061D-4D71-97A2-2371A43FDE7C}" type="datetime1">
               <a:rPr lang="en-US" smtClean="0"/>
-              <a:t>12/22/25</a:t>
+              <a:t>1/10/26</a:t>
             </a:fld>
             <a:endParaRPr lang="en-US"/>
           </a:p>
@@ -1692,7 +1692,7 @@
           <a:p>
             <a:fld id="{4C5FE133-02A7-439F-9131-2680F754099D}" type="datetime1">
               <a:rPr lang="en-US" smtClean="0"/>
-              <a:t>12/22/25</a:t>
+              <a:t>1/10/26</a:t>
             </a:fld>
             <a:endParaRPr lang="en-US"/>
           </a:p>
@@ -1909,7 +1909,7 @@
           <a:p>
             <a:fld id="{D91BF7DD-C7D0-4333-B18D-CCAF5427F9DD}" type="datetime1">
               <a:rPr lang="en-US" smtClean="0"/>
-              <a:t>12/22/25</a:t>
+              <a:t>1/10/26</a:t>
             </a:fld>
             <a:endParaRPr lang="en-US"/>
           </a:p>
@@ -2126,7 +2126,7 @@
           <a:p>
             <a:fld id="{30415979-091A-4302-A385-56FC1CE52E32}" type="datetime1">
               <a:rPr lang="en-US" smtClean="0"/>
-              <a:t>12/22/25</a:t>
+              <a:t>1/10/26</a:t>
             </a:fld>
             <a:endParaRPr lang="en-US"/>
           </a:p>
@@ -2389,7 +2389,7 @@
           <a:p>
             <a:fld id="{7836D543-476D-434F-B209-1A114B2E3F04}" type="datetime1">
               <a:rPr lang="en-US" smtClean="0"/>
-              <a:t>12/22/25</a:t>
+              <a:t>1/10/26</a:t>
             </a:fld>
             <a:endParaRPr lang="en-US"/>
           </a:p>
@@ -2647,7 +2647,7 @@
           <a:p>
             <a:fld id="{83DD0F20-7689-42E6-8664-6AA00B79F132}" type="datetime1">
               <a:rPr lang="en-US" smtClean="0"/>
-              <a:t>12/22/25</a:t>
+              <a:t>1/10/26</a:t>
             </a:fld>
             <a:endParaRPr lang="en-US"/>
           </a:p>
@@ -2920,7 +2920,7 @@
           <a:p>
             <a:fld id="{30F2F577-5BDA-4749-9F3F-0D340DC0D6A8}" type="datetime1">
               <a:rPr lang="en-US" smtClean="0"/>
-              <a:t>12/22/25</a:t>
+              <a:t>1/10/26</a:t>
             </a:fld>
             <a:endParaRPr lang="en-US"/>
           </a:p>
@@ -3178,7 +3178,7 @@
           <a:p>
             <a:fld id="{AC9378AD-A6D7-4162-BB5C-47C49B2E145B}" type="datetime1">
               <a:rPr lang="en-US" smtClean="0"/>
-              <a:t>12/22/25</a:t>
+              <a:t>1/10/26</a:t>
             </a:fld>
             <a:endParaRPr lang="en-US"/>
           </a:p>
@@ -3389,7 +3389,7 @@
           <a:p>
             <a:fld id="{C02DE44A-7CD8-4860-9BDC-2BE4C911F6D0}" type="datetime1">
               <a:rPr lang="en-US" smtClean="0"/>
-              <a:t>12/22/25</a:t>
+              <a:t>1/10/26</a:t>
             </a:fld>
             <a:endParaRPr lang="en-US"/>
           </a:p>
@@ -3661,7 +3661,7 @@
           <a:p>
             <a:fld id="{C67B65D3-547A-48A8-9F1F-13ED0B55ACC6}" type="datetime1">
               <a:rPr lang="en-US" smtClean="0"/>
-              <a:t>12/22/25</a:t>
+              <a:t>1/10/26</a:t>
             </a:fld>
             <a:endParaRPr lang="en-US"/>
           </a:p>
@@ -3877,7 +3877,7 @@
           <a:p>
             <a:fld id="{76A7CFE7-E645-4439-AA6B-DA8CF856D63E}" type="datetime1">
               <a:rPr lang="en-US" smtClean="0"/>
-              <a:t>12/22/25</a:t>
+              <a:t>1/10/26</a:t>
             </a:fld>
             <a:endParaRPr lang="en-US"/>
           </a:p>
@@ -4229,7 +4229,7 @@
           <a:p>
             <a:fld id="{E8B2C0DB-994F-48B0-91F4-5F06C3B86E32}" type="datetime1">
               <a:rPr lang="en-US" smtClean="0"/>
-              <a:t>12/22/25</a:t>
+              <a:t>1/10/26</a:t>
             </a:fld>
             <a:endParaRPr lang="en-US"/>
           </a:p>
@@ -4449,7 +4449,7 @@
           <a:p>
             <a:fld id="{D3F6A089-BE3E-4BB0-98EE-FDF712FF3613}" type="datetime1">
               <a:rPr lang="en-US" smtClean="0"/>
-              <a:t>12/22/25</a:t>
+              <a:t>1/10/26</a:t>
             </a:fld>
             <a:endParaRPr lang="en-US"/>
           </a:p>
@@ -4794,7 +4794,7 @@
           <a:p>
             <a:fld id="{AC101298-AE91-4071-9C72-5A98117ABE14}" type="datetime1">
               <a:rPr lang="en-US" smtClean="0"/>
-              <a:t>12/22/25</a:t>
+              <a:t>1/10/26</a:t>
             </a:fld>
             <a:endParaRPr lang="en-US"/>
           </a:p>
@@ -5021,7 +5021,7 @@
           <a:p>
             <a:fld id="{EABE4333-790C-44CD-B503-F52418ED809A}" type="datetime1">
               <a:rPr lang="en-US" smtClean="0"/>
-              <a:t>12/22/25</a:t>
+              <a:t>1/10/26</a:t>
             </a:fld>
             <a:endParaRPr lang="en-US"/>
           </a:p>
@@ -5392,7 +5392,7 @@
           <a:p>
             <a:fld id="{D2397CCD-8E49-4379-8DCB-9F17CAEDFC10}" type="datetime1">
               <a:rPr lang="en-US" smtClean="0"/>
-              <a:t>12/22/25</a:t>
+              <a:t>1/10/26</a:t>
             </a:fld>
             <a:endParaRPr lang="en-US"/>
           </a:p>
@@ -5599,7 +5599,7 @@
           <a:p>
             <a:fld id="{AA6146F6-C62B-441B-BAD2-D550454B4D53}" type="datetime1">
               <a:rPr lang="en-US" smtClean="0"/>
-              <a:t>12/22/25</a:t>
+              <a:t>1/10/26</a:t>
             </a:fld>
             <a:endParaRPr lang="en-US"/>
           </a:p>
@@ -5891,7 +5891,7 @@
           <a:p>
             <a:fld id="{A0383A68-D563-4FD5-B11F-54F8D5F1E37F}" type="datetime1">
               <a:rPr lang="en-US" smtClean="0"/>
-              <a:t>12/22/25</a:t>
+              <a:t>1/10/26</a:t>
             </a:fld>
             <a:endParaRPr lang="en-US"/>
           </a:p>
@@ -6188,7 +6188,7 @@
           <a:p>
             <a:fld id="{3148FABB-02FF-476F-AB37-BDD0E354E780}" type="datetime1">
               <a:rPr lang="en-US" smtClean="0"/>
-              <a:t>12/22/25</a:t>
+              <a:t>1/10/26</a:t>
             </a:fld>
             <a:endParaRPr lang="en-US"/>
           </a:p>
@@ -6546,7 +6546,7 @@
           <a:p>
             <a:fld id="{E38EAEAF-D16E-446F-97F9-D23FB245CB45}" type="datetime1">
               <a:rPr lang="en-US" smtClean="0"/>
-              <a:t>12/22/25</a:t>
+              <a:t>1/10/26</a:t>
             </a:fld>
             <a:endParaRPr lang="en-US"/>
           </a:p>
@@ -6804,7 +6804,7 @@
           <a:p>
             <a:fld id="{BCA428D3-736A-4038-886C-8BF662AA2745}" type="datetime1">
               <a:rPr lang="en-US" smtClean="0"/>
-              <a:t>12/22/25</a:t>
+              <a:t>1/10/26</a:t>
             </a:fld>
             <a:endParaRPr lang="en-US"/>
           </a:p>
@@ -7068,7 +7068,7 @@
           <a:p>
             <a:fld id="{1ED1DDEB-9B85-4E99-8A3D-ABE66C6280C3}" type="datetime1">
               <a:rPr lang="en-US" smtClean="0"/>
-              <a:t>12/22/25</a:t>
+              <a:t>1/10/26</a:t>
             </a:fld>
             <a:endParaRPr lang="en-US"/>
           </a:p>
@@ -7332,7 +7332,7 @@
           <a:p>
             <a:fld id="{A7A65DCA-443F-4667-9ED1-418507CE45A8}" type="datetime1">
               <a:rPr lang="en-US" smtClean="0"/>
-              <a:t>12/22/25</a:t>
+              <a:t>1/10/26</a:t>
             </a:fld>
             <a:endParaRPr lang="en-US"/>
           </a:p>
@@ -7552,7 +7552,7 @@
           <a:p>
             <a:fld id="{8CA1557D-4816-44D0-B6EE-6CAC6E30B54D}" type="datetime1">
               <a:rPr lang="en-US" smtClean="0"/>
-              <a:t>12/22/25</a:t>
+              <a:t>1/10/26</a:t>
             </a:fld>
             <a:endParaRPr lang="en-US"/>
           </a:p>
@@ -7768,7 +7768,7 @@
           <a:p>
             <a:fld id="{651F872E-5ED2-46B0-83A4-0C1AF0E0D91C}" type="datetime1">
               <a:rPr lang="en-US" smtClean="0"/>
-              <a:t>12/22/25</a:t>
+              <a:t>1/10/26</a:t>
             </a:fld>
             <a:endParaRPr lang="en-US"/>
           </a:p>
@@ -8039,7 +8039,7 @@
           <a:p>
             <a:fld id="{C6218575-0C6E-47B4-936E-32183810D7BF}" type="datetime1">
               <a:rPr lang="en-US" smtClean="0"/>
-              <a:t>12/22/25</a:t>
+              <a:t>1/10/26</a:t>
             </a:fld>
             <a:endParaRPr lang="en-US"/>
           </a:p>
@@ -8188,7 +8188,7 @@
           <a:p>
             <a:fld id="{91C29FB5-1C86-423F-AEAA-2683840666C3}" type="datetime1">
               <a:rPr lang="en-US" smtClean="0"/>
-              <a:t>12/22/25</a:t>
+              <a:t>1/10/26</a:t>
             </a:fld>
             <a:endParaRPr lang="en-US"/>
           </a:p>
@@ -8438,7 +8438,7 @@
           <a:p>
             <a:fld id="{111CCB4E-88AF-46AC-B7C5-30308F179659}" type="datetime1">
               <a:rPr lang="en-US" smtClean="0"/>
-              <a:t>12/22/25</a:t>
+              <a:t>1/10/26</a:t>
             </a:fld>
             <a:endParaRPr lang="en-US"/>
           </a:p>
@@ -8688,7 +8688,7 @@
           <a:p>
             <a:fld id="{5BA915B6-CC2A-4462-A7E5-B3080DF8F97D}" type="datetime1">
               <a:rPr lang="en-US" smtClean="0"/>
-              <a:t>12/22/25</a:t>
+              <a:t>1/10/26</a:t>
             </a:fld>
             <a:endParaRPr lang="en-US"/>
           </a:p>
@@ -9003,7 +9003,7 @@
           <a:p>
             <a:fld id="{506188F7-A494-4EEB-A53D-2B97B1D4CD3C}" type="datetime1">
               <a:rPr lang="en-US" smtClean="0"/>
-              <a:t>12/22/25</a:t>
+              <a:t>1/10/26</a:t>
             </a:fld>
             <a:endParaRPr lang="en-US"/>
           </a:p>
@@ -9252,7 +9252,7 @@
           <a:p>
             <a:fld id="{782E7A21-5BA8-4C4C-9705-3A1EA342AD8A}" type="datetime1">
               <a:rPr lang="en-US" smtClean="0"/>
-              <a:t>12/22/25</a:t>
+              <a:t>1/10/26</a:t>
             </a:fld>
             <a:endParaRPr lang="en-US"/>
           </a:p>
@@ -9533,7 +9533,7 @@
           <a:p>
             <a:fld id="{9F406BC0-1562-42E5-89A2-925CA193C8A6}" type="datetime1">
               <a:rPr lang="en-US" smtClean="0"/>
-              <a:t>12/22/25</a:t>
+              <a:t>1/10/26</a:t>
             </a:fld>
             <a:endParaRPr lang="en-US"/>
           </a:p>
@@ -9747,7 +9747,7 @@
           <a:p>
             <a:fld id="{507F376A-778D-45CF-8340-DB03B2DA6A3E}" type="datetime1">
               <a:rPr lang="en-US" smtClean="0"/>
-              <a:t>12/22/25</a:t>
+              <a:t>1/10/26</a:t>
             </a:fld>
             <a:endParaRPr lang="en-US"/>
           </a:p>
@@ -10020,7 +10020,7 @@
           <a:p>
             <a:fld id="{8B9DFF5A-622E-43FE-9EE9-BAAB78AB2046}" type="datetime1">
               <a:rPr lang="en-US" smtClean="0"/>
-              <a:t>12/22/25</a:t>
+              <a:t>1/10/26</a:t>
             </a:fld>
             <a:endParaRPr lang="en-US"/>
           </a:p>
@@ -10445,7 +10445,7 @@
           <a:p>
             <a:fld id="{FF55C09E-FF30-4AA0-A227-171955622259}" type="datetime1">
               <a:rPr lang="en-US" smtClean="0"/>
-              <a:t>12/22/25</a:t>
+              <a:t>1/10/26</a:t>
             </a:fld>
             <a:endParaRPr lang="en-US"/>
           </a:p>
@@ -10589,7 +10589,7 @@
           <a:p>
             <a:fld id="{97B279FF-407B-4B41-9E69-DE66ED04A328}" type="datetime1">
               <a:rPr lang="en-US" smtClean="0"/>
-              <a:t>12/22/25</a:t>
+              <a:t>1/10/26</a:t>
             </a:fld>
             <a:endParaRPr lang="en-US"/>
           </a:p>
@@ -10705,7 +10705,7 @@
           <a:p>
             <a:fld id="{A803E812-757D-4139-AF81-227C72D4B544}" type="datetime1">
               <a:rPr lang="en-US" smtClean="0"/>
-              <a:t>12/22/25</a:t>
+              <a:t>1/10/26</a:t>
             </a:fld>
             <a:endParaRPr lang="en-US"/>
           </a:p>
@@ -11013,7 +11013,7 @@
           <a:p>
             <a:fld id="{07D6A7E1-C424-43A5-938A-12DEC0A1D59D}" type="datetime1">
               <a:rPr lang="en-US" smtClean="0"/>
-              <a:t>12/22/25</a:t>
+              <a:t>1/10/26</a:t>
             </a:fld>
             <a:endParaRPr lang="en-US"/>
           </a:p>
@@ -11320,7 +11320,7 @@
           <a:p>
             <a:fld id="{807C4FC2-B89B-4919-A96B-662A3584681C}" type="datetime1">
               <a:rPr lang="en-US" smtClean="0"/>
-              <a:t>12/22/25</a:t>
+              <a:t>1/10/26</a:t>
             </a:fld>
             <a:endParaRPr lang="en-US"/>
           </a:p>
@@ -11563,7 +11563,7 @@
           <a:p>
             <a:fld id="{7C24BE51-D660-433D-AABA-154BE028E64E}" type="datetime1">
               <a:rPr lang="en-US" smtClean="0"/>
-              <a:t>12/22/25</a:t>
+              <a:t>1/10/26</a:t>
             </a:fld>
             <a:endParaRPr lang="en-US"/>
           </a:p>
@@ -11808,7 +11808,7 @@
           <a:p>
             <a:fld id="{DB61F76E-6064-4431-B5C4-29A511725BCF}" type="datetime1">
               <a:rPr lang="en-US" smtClean="0"/>
-              <a:t>12/22/25</a:t>
+              <a:t>1/10/26</a:t>
             </a:fld>
             <a:endParaRPr lang="en-US"/>
           </a:p>
@@ -12005,7 +12005,7 @@
           <a:p>
             <a:fld id="{1CBE73BE-5F1F-40EF-8F67-E3F24D65884D}" type="datetime1">
               <a:rPr lang="en-US" smtClean="0"/>
-              <a:t>12/22/25</a:t>
+              <a:t>1/10/26</a:t>
             </a:fld>
             <a:endParaRPr lang="en-US"/>
           </a:p>
@@ -12202,7 +12202,7 @@
           <a:p>
             <a:fld id="{3C868EF1-668D-4AD0-8652-1F3B3622EDC2}" type="datetime1">
               <a:rPr lang="en-US" smtClean="0"/>
-              <a:t>12/22/25</a:t>
+              <a:t>1/10/26</a:t>
             </a:fld>
             <a:endParaRPr lang="en-US"/>
           </a:p>
@@ -12429,7 +12429,7 @@
           <a:p>
             <a:fld id="{1E95609F-9B5B-4E29-8DB1-457A85E01A27}" type="datetime1">
               <a:rPr lang="en-US" smtClean="0"/>
-              <a:t>12/22/25</a:t>
+              <a:t>1/10/26</a:t>
             </a:fld>
             <a:endParaRPr lang="en-US"/>
           </a:p>
@@ -12590,7 +12590,7 @@
           <a:p>
             <a:fld id="{16A0DE37-B9D6-425C-B79B-6C6DFFBD0DA2}" type="datetime1">
               <a:rPr lang="en-US" smtClean="0"/>
-              <a:t>12/22/25</a:t>
+              <a:t>1/10/26</a:t>
             </a:fld>
             <a:endParaRPr lang="en-US"/>
           </a:p>
@@ -12835,7 +12835,7 @@
           <a:p>
             <a:fld id="{1045B0EE-4023-4E3C-8875-10AA631453CF}" type="datetime1">
               <a:rPr lang="en-US" smtClean="0"/>
-              <a:t>12/22/25</a:t>
+              <a:t>1/10/26</a:t>
             </a:fld>
             <a:endParaRPr lang="en-US"/>
           </a:p>
@@ -13077,7 +13077,7 @@
           <a:p>
             <a:fld id="{5EE9E671-1C83-40F7-9D33-FE8AAC7F721F}" type="datetime1">
               <a:rPr lang="en-US" smtClean="0"/>
-              <a:t>12/22/25</a:t>
+              <a:t>1/10/26</a:t>
             </a:fld>
             <a:endParaRPr lang="en-US"/>
           </a:p>
@@ -13545,89 +13545,6 @@
       </p:grpSpPr>
       <p:sp>
         <p:nvSpPr>
-          <p:cNvPr id="2" name="Title 1"/>
-          <p:cNvSpPr>
-            <a:spLocks noGrp="1"/>
-          </p:cNvSpPr>
-          <p:nvPr>
-            <p:ph type="title"/>
-          </p:nvPr>
-        </p:nvSpPr>
-        <p:spPr>
-          <a:xfrm>
-            <a:off x="754380" y="201930"/>
-            <a:ext cx="10353377" cy="1555373"/>
-          </a:xfrm>
-        </p:spPr>
-        <p:txBody>
-          <a:bodyPr>
-            <a:normAutofit fontScale="90000"/>
-          </a:bodyPr>
-          <a:lstStyle/>
-          <a:p>
-            <a:pPr algn="l"/>
-            <a:br>
-              <a:rPr lang="en-GB" dirty="0"/>
-            </a:br>
-            <a:br>
-              <a:rPr lang="en-GB" dirty="0"/>
-            </a:br>
-            <a:br>
-              <a:rPr lang="en-GB" dirty="0"/>
-            </a:br>
-            <a:r>
-              <a:rPr lang="en-GB" dirty="0"/>
-              <a:t>R.C. Church of the Immaculate Conception</a:t>
-            </a:r>
-            <a:br>
-              <a:rPr lang="en-GB" dirty="0"/>
-            </a:br>
-            <a:r>
-              <a:rPr lang="en-GB" dirty="0"/>
-              <a:t> </a:t>
-            </a:r>
-            <a:r>
-              <a:rPr lang="en-GB" sz="3840" dirty="0"/>
-              <a:t>1</a:t>
-            </a:r>
-            <a:r>
-              <a:rPr lang="en-GB" sz="3840" baseline="30000" dirty="0"/>
-              <a:t>st</a:t>
-            </a:r>
-            <a:r>
-              <a:rPr lang="en-GB" sz="3840" dirty="0"/>
-              <a:t> Sunday of Advent</a:t>
-            </a:r>
-            <a:br>
-              <a:rPr lang="en-GB" sz="3840" dirty="0"/>
-            </a:br>
-            <a:r>
-              <a:rPr lang="en-GB" sz="3840" dirty="0"/>
-              <a:t> Year A 30</a:t>
-            </a:r>
-            <a:r>
-              <a:rPr lang="en-GB" sz="3840" baseline="30000" dirty="0"/>
-              <a:t>th</a:t>
-            </a:r>
-            <a:r>
-              <a:rPr lang="en-GB" sz="3840" dirty="0"/>
-              <a:t> Nov.</a:t>
-            </a:r>
-            <a:br>
-              <a:rPr lang="en-GB" dirty="0"/>
-            </a:br>
-            <a:br>
-              <a:rPr lang="en-GB" dirty="0"/>
-            </a:br>
-            <a:br>
-              <a:rPr lang="en-GB" dirty="0"/>
-            </a:br>
-            <a:endParaRPr lang="en-GB" sz="3360" dirty="0"/>
-          </a:p>
-        </p:txBody>
-      </p:sp>
-      <p:sp>
-        <p:nvSpPr>
           <p:cNvPr id="3" name="AutoShape 2" descr="Image result for spirit of Wisdom came to me."/>
           <p:cNvSpPr>
             <a:spLocks noChangeAspect="1" noChangeArrowheads="1"/>
@@ -13719,6 +13636,80 @@
           </a:extLst>
         </p:spPr>
       </p:pic>
+      <p:sp>
+        <p:nvSpPr>
+          <p:cNvPr id="2" name="Title 1"/>
+          <p:cNvSpPr>
+            <a:spLocks noGrp="1"/>
+          </p:cNvSpPr>
+          <p:nvPr>
+            <p:ph type="title"/>
+          </p:nvPr>
+        </p:nvSpPr>
+        <p:spPr>
+          <a:xfrm>
+            <a:off x="754380" y="201930"/>
+            <a:ext cx="10353377" cy="1555373"/>
+          </a:xfrm>
+        </p:spPr>
+        <p:txBody>
+          <a:bodyPr>
+            <a:normAutofit fontScale="90000"/>
+          </a:bodyPr>
+          <a:lstStyle/>
+          <a:p>
+            <a:pPr algn="l"/>
+            <a:r>
+              <a:rPr lang="en-GB" dirty="0"/>
+              <a:t>R.C. Church of the Immaculate Conception</a:t>
+            </a:r>
+            <a:br>
+              <a:rPr lang="en-GB" dirty="0"/>
+            </a:br>
+            <a:r>
+              <a:rPr lang="en-GB" dirty="0"/>
+              <a:t> </a:t>
+            </a:r>
+            <a:r>
+              <a:rPr lang="en-GB" sz="3840" dirty="0"/>
+              <a:t>1</a:t>
+            </a:r>
+            <a:r>
+              <a:rPr lang="en-GB" sz="3840" baseline="30000" dirty="0"/>
+              <a:t>st</a:t>
+            </a:r>
+            <a:r>
+              <a:rPr lang="en-GB" sz="3840" dirty="0"/>
+              <a:t> Sunday of Advent</a:t>
+            </a:r>
+            <a:br>
+              <a:rPr lang="en-GB" sz="3840" dirty="0"/>
+            </a:br>
+            <a:r>
+              <a:rPr lang="en-GB" sz="3840" dirty="0"/>
+              <a:t> Year A 30</a:t>
+            </a:r>
+            <a:r>
+              <a:rPr lang="en-GB" sz="3840" baseline="30000" dirty="0"/>
+              <a:t>th</a:t>
+            </a:r>
+            <a:r>
+              <a:rPr lang="en-GB" sz="3840" dirty="0"/>
+              <a:t> Nov.</a:t>
+            </a:r>
+            <a:br>
+              <a:rPr lang="en-GB" dirty="0"/>
+            </a:br>
+            <a:br>
+              <a:rPr lang="en-GB" dirty="0"/>
+            </a:br>
+            <a:br>
+              <a:rPr lang="en-GB" dirty="0"/>
+            </a:br>
+            <a:endParaRPr lang="en-GB" sz="3360" dirty="0"/>
+          </a:p>
+        </p:txBody>
+      </p:sp>
     </p:spTree>
     <p:extLst>
       <p:ext uri="{BB962C8B-B14F-4D97-AF65-F5344CB8AC3E}">

</xml_diff>